<commit_message>
composition over inheritence, adpater pattern
</commit_message>
<xml_diff>
--- a/DesignPatterns.pptx
+++ b/DesignPatterns.pptx
@@ -7,11 +7,17 @@
   <p:sldIdLst>
     <p:sldId id="256" r:id="rId2"/>
     <p:sldId id="303" r:id="rId3"/>
-    <p:sldId id="304" r:id="rId4"/>
-    <p:sldId id="305" r:id="rId5"/>
-    <p:sldId id="306" r:id="rId6"/>
-    <p:sldId id="307" r:id="rId7"/>
-    <p:sldId id="269" r:id="rId8"/>
+    <p:sldId id="311" r:id="rId4"/>
+    <p:sldId id="304" r:id="rId5"/>
+    <p:sldId id="305" r:id="rId6"/>
+    <p:sldId id="306" r:id="rId7"/>
+    <p:sldId id="307" r:id="rId8"/>
+    <p:sldId id="308" r:id="rId9"/>
+    <p:sldId id="309" r:id="rId10"/>
+    <p:sldId id="310" r:id="rId11"/>
+    <p:sldId id="312" r:id="rId12"/>
+    <p:sldId id="313" r:id="rId13"/>
+    <p:sldId id="269" r:id="rId14"/>
   </p:sldIdLst>
   <p:sldSz cx="9144000" cy="6858000" type="screen4x3"/>
   <p:notesSz cx="6858000" cy="9144000"/>
@@ -301,7 +307,7 @@
           <a:p>
             <a:fld id="{8F235549-BF0A-4B98-8561-3786244E808C}" type="datetimeFigureOut">
               <a:rPr lang="en-US" smtClean="0"/>
-              <a:t>4/4/2016</a:t>
+              <a:t>3/27/2018</a:t>
             </a:fld>
             <a:endParaRPr lang="en-US"/>
           </a:p>
@@ -501,7 +507,7 @@
           <a:p>
             <a:fld id="{8F235549-BF0A-4B98-8561-3786244E808C}" type="datetimeFigureOut">
               <a:rPr lang="en-US" smtClean="0"/>
-              <a:t>4/4/2016</a:t>
+              <a:t>3/27/2018</a:t>
             </a:fld>
             <a:endParaRPr lang="en-US"/>
           </a:p>
@@ -676,7 +682,7 @@
           <a:p>
             <a:fld id="{8F235549-BF0A-4B98-8561-3786244E808C}" type="datetimeFigureOut">
               <a:rPr lang="en-US" smtClean="0"/>
-              <a:t>4/4/2016</a:t>
+              <a:t>3/27/2018</a:t>
             </a:fld>
             <a:endParaRPr lang="en-US"/>
           </a:p>
@@ -841,7 +847,7 @@
           <a:p>
             <a:fld id="{8F235549-BF0A-4B98-8561-3786244E808C}" type="datetimeFigureOut">
               <a:rPr lang="en-US" smtClean="0"/>
-              <a:t>4/4/2016</a:t>
+              <a:t>3/27/2018</a:t>
             </a:fld>
             <a:endParaRPr lang="en-US"/>
           </a:p>
@@ -1089,7 +1095,7 @@
           <a:p>
             <a:fld id="{8F235549-BF0A-4B98-8561-3786244E808C}" type="datetimeFigureOut">
               <a:rPr lang="en-US" smtClean="0"/>
-              <a:t>4/4/2016</a:t>
+              <a:t>3/27/2018</a:t>
             </a:fld>
             <a:endParaRPr lang="en-US"/>
           </a:p>
@@ -1407,7 +1413,7 @@
           <a:p>
             <a:fld id="{8F235549-BF0A-4B98-8561-3786244E808C}" type="datetimeFigureOut">
               <a:rPr lang="en-US" smtClean="0"/>
-              <a:t>4/4/2016</a:t>
+              <a:t>3/27/2018</a:t>
             </a:fld>
             <a:endParaRPr lang="en-US"/>
           </a:p>
@@ -1873,7 +1879,7 @@
           <a:p>
             <a:fld id="{8F235549-BF0A-4B98-8561-3786244E808C}" type="datetimeFigureOut">
               <a:rPr lang="en-US" smtClean="0"/>
-              <a:t>4/4/2016</a:t>
+              <a:t>3/27/2018</a:t>
             </a:fld>
             <a:endParaRPr lang="en-US"/>
           </a:p>
@@ -2021,7 +2027,7 @@
           <a:p>
             <a:fld id="{8F235549-BF0A-4B98-8561-3786244E808C}" type="datetimeFigureOut">
               <a:rPr lang="en-US" smtClean="0"/>
-              <a:t>4/4/2016</a:t>
+              <a:t>3/27/2018</a:t>
             </a:fld>
             <a:endParaRPr lang="en-US"/>
           </a:p>
@@ -2111,7 +2117,7 @@
           <a:p>
             <a:fld id="{8F235549-BF0A-4B98-8561-3786244E808C}" type="datetimeFigureOut">
               <a:rPr lang="en-US" smtClean="0"/>
-              <a:t>4/4/2016</a:t>
+              <a:t>3/27/2018</a:t>
             </a:fld>
             <a:endParaRPr lang="en-US"/>
           </a:p>
@@ -2385,7 +2391,7 @@
           <a:p>
             <a:fld id="{8F235549-BF0A-4B98-8561-3786244E808C}" type="datetimeFigureOut">
               <a:rPr lang="en-US" smtClean="0"/>
-              <a:t>4/4/2016</a:t>
+              <a:t>3/27/2018</a:t>
             </a:fld>
             <a:endParaRPr lang="en-US"/>
           </a:p>
@@ -2690,7 +2696,7 @@
           <a:p>
             <a:fld id="{8F235549-BF0A-4B98-8561-3786244E808C}" type="datetimeFigureOut">
               <a:rPr lang="en-US" smtClean="0"/>
-              <a:t>4/4/2016</a:t>
+              <a:t>3/27/2018</a:t>
             </a:fld>
             <a:endParaRPr lang="en-US"/>
           </a:p>
@@ -2988,7 +2994,7 @@
           <a:p>
             <a:fld id="{8F235549-BF0A-4B98-8561-3786244E808C}" type="datetimeFigureOut">
               <a:rPr lang="en-US" smtClean="0"/>
-              <a:t>4/4/2016</a:t>
+              <a:t>3/27/2018</a:t>
             </a:fld>
             <a:endParaRPr lang="en-US"/>
           </a:p>
@@ -3428,6 +3434,690 @@
 </p:sld>
 </file>
 
+<file path=ppt/slides/slide10.xml><?xml version="1.0" encoding="utf-8"?>
+<p:sld xmlns:a="http://schemas.openxmlformats.org/drawingml/2006/main" xmlns:r="http://schemas.openxmlformats.org/officeDocument/2006/relationships" xmlns:p="http://schemas.openxmlformats.org/presentationml/2006/main">
+  <p:cSld>
+    <p:bg>
+      <p:bgPr>
+        <a:noFill/>
+        <a:effectLst/>
+      </p:bgPr>
+    </p:bg>
+    <p:spTree>
+      <p:nvGrpSpPr>
+        <p:cNvPr id="1" name=""/>
+        <p:cNvGrpSpPr/>
+        <p:nvPr/>
+      </p:nvGrpSpPr>
+      <p:grpSpPr>
+        <a:xfrm>
+          <a:off x="0" y="0"/>
+          <a:ext cx="0" cy="0"/>
+          <a:chOff x="0" y="0"/>
+          <a:chExt cx="0" cy="0"/>
+        </a:xfrm>
+      </p:grpSpPr>
+      <p:sp>
+        <p:nvSpPr>
+          <p:cNvPr id="2" name="Title 1"/>
+          <p:cNvSpPr>
+            <a:spLocks noGrp="1"/>
+          </p:cNvSpPr>
+          <p:nvPr>
+            <p:ph type="title"/>
+          </p:nvPr>
+        </p:nvSpPr>
+        <p:spPr/>
+        <p:txBody>
+          <a:bodyPr/>
+          <a:lstStyle/>
+          <a:p>
+            <a:r>
+              <a:rPr lang="en-US" dirty="0"/>
+              <a:t>Bridge Pattern - Structural </a:t>
+            </a:r>
+            <a:endParaRPr lang="en-US" dirty="0"/>
+          </a:p>
+        </p:txBody>
+      </p:sp>
+      <p:sp>
+        <p:nvSpPr>
+          <p:cNvPr id="3" name="Content Placeholder 2"/>
+          <p:cNvSpPr>
+            <a:spLocks noGrp="1"/>
+          </p:cNvSpPr>
+          <p:nvPr>
+            <p:ph idx="1"/>
+          </p:nvPr>
+        </p:nvSpPr>
+        <p:spPr/>
+        <p:txBody>
+          <a:bodyPr>
+            <a:normAutofit/>
+          </a:bodyPr>
+          <a:lstStyle/>
+          <a:p>
+            <a:r>
+              <a:rPr lang="en-GB" sz="1600" dirty="0"/>
+              <a:t>When we use inheritance, we are permanently binding the implementation to the abstraction. As a result, any change made to one affects the other. A more flexible way is to </a:t>
+            </a:r>
+            <a:r>
+              <a:rPr lang="en-GB" sz="1600" b="1" dirty="0">
+                <a:solidFill>
+                  <a:srgbClr val="FF0000"/>
+                </a:solidFill>
+              </a:rPr>
+              <a:t>separate</a:t>
+            </a:r>
+            <a:r>
+              <a:rPr lang="en-GB" sz="1600" dirty="0"/>
+              <a:t> the </a:t>
+            </a:r>
+            <a:r>
+              <a:rPr lang="en-GB" sz="1600" b="1" dirty="0">
+                <a:solidFill>
+                  <a:srgbClr val="FF0000"/>
+                </a:solidFill>
+              </a:rPr>
+              <a:t>abstraction and the implementation</a:t>
+            </a:r>
+            <a:r>
+              <a:rPr lang="en-GB" sz="1600" dirty="0"/>
+              <a:t>, and this is where the bridge pattern comes </a:t>
+            </a:r>
+            <a:r>
+              <a:rPr lang="en-GB" sz="1600" dirty="0" smtClean="0"/>
+              <a:t>in</a:t>
+            </a:r>
+          </a:p>
+          <a:p>
+            <a:r>
+              <a:rPr lang="en-GB" sz="1600" dirty="0" smtClean="0"/>
+              <a:t>Example:- Message sender implementation i.e. </a:t>
+            </a:r>
+            <a:r>
+              <a:rPr lang="en-GB" sz="1600" dirty="0" err="1" smtClean="0"/>
+              <a:t>EmailMessageSender</a:t>
+            </a:r>
+            <a:r>
+              <a:rPr lang="en-GB" sz="1600" dirty="0" smtClean="0"/>
+              <a:t>, </a:t>
+            </a:r>
+            <a:r>
+              <a:rPr lang="en-GB" sz="1600" dirty="0" err="1" smtClean="0"/>
+              <a:t>TextMessageSender</a:t>
+            </a:r>
+            <a:endParaRPr lang="en-GB" sz="1600" dirty="0" smtClean="0"/>
+          </a:p>
+          <a:p>
+            <a:endParaRPr lang="en-GB" sz="1400" dirty="0"/>
+          </a:p>
+        </p:txBody>
+      </p:sp>
+      <p:pic>
+        <p:nvPicPr>
+          <p:cNvPr id="1026" name="Picture 2"/>
+          <p:cNvPicPr>
+            <a:picLocks noChangeAspect="1" noChangeArrowheads="1"/>
+          </p:cNvPicPr>
+          <p:nvPr/>
+        </p:nvPicPr>
+        <p:blipFill>
+          <a:blip r:embed="rId2">
+            <a:extLst>
+              <a:ext uri="{28A0092B-C50C-407E-A947-70E740481C1C}">
+                <a14:useLocalDpi xmlns:a14="http://schemas.microsoft.com/office/drawing/2010/main" val="0"/>
+              </a:ext>
+            </a:extLst>
+          </a:blip>
+          <a:srcRect/>
+          <a:stretch>
+            <a:fillRect/>
+          </a:stretch>
+        </p:blipFill>
+        <p:spPr bwMode="auto">
+          <a:xfrm>
+            <a:off x="1115616" y="3284985"/>
+            <a:ext cx="4652280" cy="1872207"/>
+          </a:xfrm>
+          <a:prstGeom prst="rect">
+            <a:avLst/>
+          </a:prstGeom>
+          <a:noFill/>
+          <a:ln>
+            <a:noFill/>
+          </a:ln>
+          <a:extLst>
+            <a:ext uri="{909E8E84-426E-40DD-AFC4-6F175D3DCCD1}">
+              <a14:hiddenFill xmlns:a14="http://schemas.microsoft.com/office/drawing/2010/main">
+                <a:solidFill>
+                  <a:schemeClr val="accent1"/>
+                </a:solidFill>
+              </a14:hiddenFill>
+            </a:ext>
+            <a:ext uri="{91240B29-F687-4F45-9708-019B960494DF}">
+              <a14:hiddenLine xmlns:a14="http://schemas.microsoft.com/office/drawing/2010/main" w="9525">
+                <a:solidFill>
+                  <a:schemeClr val="tx1"/>
+                </a:solidFill>
+                <a:miter lim="800000"/>
+                <a:headEnd/>
+                <a:tailEnd/>
+              </a14:hiddenLine>
+            </a:ext>
+          </a:extLst>
+        </p:spPr>
+      </p:pic>
+    </p:spTree>
+    <p:extLst>
+      <p:ext uri="{BB962C8B-B14F-4D97-AF65-F5344CB8AC3E}">
+        <p14:creationId xmlns:p14="http://schemas.microsoft.com/office/powerpoint/2010/main" val="1438374134"/>
+      </p:ext>
+    </p:extLst>
+  </p:cSld>
+  <p:clrMapOvr>
+    <a:masterClrMapping/>
+  </p:clrMapOvr>
+  <p:timing>
+    <p:tnLst>
+      <p:par>
+        <p:cTn id="1" dur="indefinite" restart="never" nodeType="tmRoot"/>
+      </p:par>
+    </p:tnLst>
+  </p:timing>
+</p:sld>
+</file>
+
+<file path=ppt/slides/slide11.xml><?xml version="1.0" encoding="utf-8"?>
+<p:sld xmlns:a="http://schemas.openxmlformats.org/drawingml/2006/main" xmlns:r="http://schemas.openxmlformats.org/officeDocument/2006/relationships" xmlns:p="http://schemas.openxmlformats.org/presentationml/2006/main">
+  <p:cSld>
+    <p:bg>
+      <p:bgPr>
+        <a:noFill/>
+        <a:effectLst/>
+      </p:bgPr>
+    </p:bg>
+    <p:spTree>
+      <p:nvGrpSpPr>
+        <p:cNvPr id="1" name=""/>
+        <p:cNvGrpSpPr/>
+        <p:nvPr/>
+      </p:nvGrpSpPr>
+      <p:grpSpPr>
+        <a:xfrm>
+          <a:off x="0" y="0"/>
+          <a:ext cx="0" cy="0"/>
+          <a:chOff x="0" y="0"/>
+          <a:chExt cx="0" cy="0"/>
+        </a:xfrm>
+      </p:grpSpPr>
+      <p:sp>
+        <p:nvSpPr>
+          <p:cNvPr id="2" name="Title 1"/>
+          <p:cNvSpPr>
+            <a:spLocks noGrp="1"/>
+          </p:cNvSpPr>
+          <p:nvPr>
+            <p:ph type="title"/>
+          </p:nvPr>
+        </p:nvSpPr>
+        <p:spPr/>
+        <p:txBody>
+          <a:bodyPr/>
+          <a:lstStyle/>
+          <a:p>
+            <a:r>
+              <a:rPr lang="en-US" dirty="0" smtClean="0"/>
+              <a:t>Adapter Pattern </a:t>
+            </a:r>
+            <a:r>
+              <a:rPr lang="en-US" dirty="0"/>
+              <a:t>- Structural </a:t>
+            </a:r>
+            <a:endParaRPr lang="en-US" dirty="0"/>
+          </a:p>
+        </p:txBody>
+      </p:sp>
+      <p:sp>
+        <p:nvSpPr>
+          <p:cNvPr id="3" name="Content Placeholder 2"/>
+          <p:cNvSpPr>
+            <a:spLocks noGrp="1"/>
+          </p:cNvSpPr>
+          <p:nvPr>
+            <p:ph idx="1"/>
+          </p:nvPr>
+        </p:nvSpPr>
+        <p:spPr>
+          <a:xfrm>
+            <a:off x="457200" y="1600200"/>
+            <a:ext cx="8229600" cy="4876800"/>
+          </a:xfrm>
+        </p:spPr>
+        <p:txBody>
+          <a:bodyPr>
+            <a:normAutofit/>
+          </a:bodyPr>
+          <a:lstStyle/>
+          <a:p>
+            <a:r>
+              <a:rPr lang="en-GB" sz="1600" dirty="0"/>
+              <a:t>Convert the interface of a class into another interface clients expect. Adapter lets classes </a:t>
+            </a:r>
+            <a:r>
+              <a:rPr lang="en-GB" sz="1600" b="1" dirty="0">
+                <a:solidFill>
+                  <a:srgbClr val="FF0000"/>
+                </a:solidFill>
+              </a:rPr>
+              <a:t>work together that couldn’t </a:t>
+            </a:r>
+            <a:r>
+              <a:rPr lang="en-GB" sz="1600" dirty="0"/>
+              <a:t>otherwise because of incompatible </a:t>
+            </a:r>
+            <a:r>
+              <a:rPr lang="en-GB" sz="1600" dirty="0" smtClean="0"/>
+              <a:t>interfaces</a:t>
+            </a:r>
+          </a:p>
+          <a:p>
+            <a:r>
+              <a:rPr lang="en-GB" sz="1600" dirty="0" smtClean="0"/>
+              <a:t>Example:- </a:t>
+            </a:r>
+            <a:r>
+              <a:rPr lang="en-GB" sz="1600" dirty="0" err="1" smtClean="0"/>
+              <a:t>TextFormattable</a:t>
+            </a:r>
+            <a:r>
+              <a:rPr lang="en-GB" sz="1600" dirty="0" smtClean="0"/>
+              <a:t>, </a:t>
+            </a:r>
+            <a:r>
+              <a:rPr lang="en-GB" sz="1400" dirty="0" err="1" smtClean="0"/>
+              <a:t>NewLineFormatter</a:t>
+            </a:r>
+            <a:endParaRPr lang="en-GB" sz="1400" dirty="0" smtClean="0"/>
+          </a:p>
+          <a:p>
+            <a:r>
+              <a:rPr lang="en-GB" sz="1400" dirty="0" smtClean="0"/>
+              <a:t>New requirement:- </a:t>
+            </a:r>
+            <a:r>
+              <a:rPr lang="en-GB" sz="1400" dirty="0" err="1" smtClean="0"/>
+              <a:t>CsvFormattable</a:t>
+            </a:r>
+            <a:r>
+              <a:rPr lang="en-GB" sz="1400" dirty="0" smtClean="0"/>
+              <a:t>, </a:t>
+            </a:r>
+            <a:r>
+              <a:rPr lang="en-GB" sz="1400" dirty="0" err="1" smtClean="0"/>
+              <a:t>CsvFormatter</a:t>
+            </a:r>
+            <a:endParaRPr lang="en-GB" sz="1400" dirty="0" smtClean="0"/>
+          </a:p>
+          <a:p>
+            <a:r>
+              <a:rPr lang="en-GB" sz="1400" b="1" dirty="0" smtClean="0"/>
+              <a:t>Solution:- </a:t>
+            </a:r>
+            <a:r>
+              <a:rPr lang="en-GB" sz="1400" dirty="0" err="1"/>
+              <a:t>CsvAdapterImpl</a:t>
+            </a:r>
+            <a:r>
+              <a:rPr lang="en-GB" sz="1400" dirty="0"/>
+              <a:t> that </a:t>
+            </a:r>
+            <a:r>
+              <a:rPr lang="en-GB" sz="1400" dirty="0" smtClean="0"/>
+              <a:t>will </a:t>
+            </a:r>
+            <a:r>
+              <a:rPr lang="en-GB" sz="1400" dirty="0"/>
+              <a:t>act as an adapter to make both the incompatible </a:t>
+            </a:r>
+            <a:r>
+              <a:rPr lang="en-GB" sz="1400" dirty="0" smtClean="0"/>
+              <a:t>interfaces </a:t>
+            </a:r>
+            <a:r>
+              <a:rPr lang="en-GB" sz="1400" dirty="0"/>
+              <a:t>(</a:t>
+            </a:r>
+            <a:r>
+              <a:rPr lang="en-GB" sz="1400" dirty="0" err="1"/>
+              <a:t>TextFormattable</a:t>
+            </a:r>
+            <a:r>
+              <a:rPr lang="en-GB" sz="1400" dirty="0"/>
+              <a:t> and </a:t>
+            </a:r>
+            <a:r>
+              <a:rPr lang="en-GB" sz="1400" dirty="0" err="1"/>
+              <a:t>CsvFormattable</a:t>
+            </a:r>
+            <a:r>
+              <a:rPr lang="en-GB" sz="1400" dirty="0"/>
+              <a:t>) work </a:t>
+            </a:r>
+            <a:r>
+              <a:rPr lang="en-GB" sz="1400" dirty="0" smtClean="0"/>
+              <a:t>together</a:t>
+            </a:r>
+          </a:p>
+          <a:p>
+            <a:r>
+              <a:rPr lang="en-GB" sz="1400" dirty="0"/>
+              <a:t>There are two variants of adapters: Object adapter that relies on composition and class adapter that relies on inheritance.</a:t>
+            </a:r>
+            <a:endParaRPr lang="en-GB" sz="1400" dirty="0"/>
+          </a:p>
+        </p:txBody>
+      </p:sp>
+    </p:spTree>
+    <p:extLst>
+      <p:ext uri="{BB962C8B-B14F-4D97-AF65-F5344CB8AC3E}">
+        <p14:creationId xmlns:p14="http://schemas.microsoft.com/office/powerpoint/2010/main" val="1280350887"/>
+      </p:ext>
+    </p:extLst>
+  </p:cSld>
+  <p:clrMapOvr>
+    <a:masterClrMapping/>
+  </p:clrMapOvr>
+  <p:timing>
+    <p:tnLst>
+      <p:par>
+        <p:cTn id="1" dur="indefinite" restart="never" nodeType="tmRoot"/>
+      </p:par>
+    </p:tnLst>
+  </p:timing>
+</p:sld>
+</file>
+
+<file path=ppt/slides/slide12.xml><?xml version="1.0" encoding="utf-8"?>
+<p:sld xmlns:a="http://schemas.openxmlformats.org/drawingml/2006/main" xmlns:r="http://schemas.openxmlformats.org/officeDocument/2006/relationships" xmlns:p="http://schemas.openxmlformats.org/presentationml/2006/main">
+  <p:cSld>
+    <p:bg>
+      <p:bgPr>
+        <a:noFill/>
+        <a:effectLst/>
+      </p:bgPr>
+    </p:bg>
+    <p:spTree>
+      <p:nvGrpSpPr>
+        <p:cNvPr id="1" name=""/>
+        <p:cNvGrpSpPr/>
+        <p:nvPr/>
+      </p:nvGrpSpPr>
+      <p:grpSpPr>
+        <a:xfrm>
+          <a:off x="0" y="0"/>
+          <a:ext cx="0" cy="0"/>
+          <a:chOff x="0" y="0"/>
+          <a:chExt cx="0" cy="0"/>
+        </a:xfrm>
+      </p:grpSpPr>
+      <p:sp>
+        <p:nvSpPr>
+          <p:cNvPr id="2" name="Title 1"/>
+          <p:cNvSpPr>
+            <a:spLocks noGrp="1"/>
+          </p:cNvSpPr>
+          <p:nvPr>
+            <p:ph type="title"/>
+          </p:nvPr>
+        </p:nvSpPr>
+        <p:spPr/>
+        <p:txBody>
+          <a:bodyPr/>
+          <a:lstStyle/>
+          <a:p>
+            <a:r>
+              <a:rPr lang="en-US" dirty="0" smtClean="0"/>
+              <a:t>Composition over inheritance</a:t>
+            </a:r>
+            <a:endParaRPr lang="en-US" dirty="0"/>
+          </a:p>
+        </p:txBody>
+      </p:sp>
+      <p:sp>
+        <p:nvSpPr>
+          <p:cNvPr id="3" name="Content Placeholder 2"/>
+          <p:cNvSpPr>
+            <a:spLocks noGrp="1"/>
+          </p:cNvSpPr>
+          <p:nvPr>
+            <p:ph idx="1"/>
+          </p:nvPr>
+        </p:nvSpPr>
+        <p:spPr>
+          <a:xfrm>
+            <a:off x="457200" y="1600200"/>
+            <a:ext cx="8229600" cy="4876800"/>
+          </a:xfrm>
+        </p:spPr>
+        <p:txBody>
+          <a:bodyPr>
+            <a:normAutofit/>
+          </a:bodyPr>
+          <a:lstStyle/>
+          <a:p>
+            <a:r>
+              <a:rPr lang="en-GB" sz="1600" dirty="0" smtClean="0"/>
+              <a:t>This principle states that classes should achieve polymorphic behaviour and code reuse by their composition rather than inheritance from a base or parent class</a:t>
+            </a:r>
+          </a:p>
+          <a:p>
+            <a:r>
+              <a:rPr lang="en-GB" sz="1600" b="1" dirty="0" smtClean="0">
+                <a:solidFill>
+                  <a:srgbClr val="00B050"/>
+                </a:solidFill>
+              </a:rPr>
+              <a:t>Benefits</a:t>
+            </a:r>
+            <a:r>
+              <a:rPr lang="en-GB" sz="1600" dirty="0" smtClean="0"/>
+              <a:t> – Higher flexibility, provides more stable business domain, accommodates future requirements changes that would otherwise require complex restructuring  </a:t>
+            </a:r>
+          </a:p>
+          <a:p>
+            <a:r>
+              <a:rPr lang="en-GB" sz="1600" dirty="0" smtClean="0"/>
+              <a:t>It </a:t>
+            </a:r>
+            <a:r>
+              <a:rPr lang="en-GB" sz="1600" dirty="0"/>
+              <a:t>is more natural to build business-domain classes out of various components than trying to find commonality between them and creating a family </a:t>
+            </a:r>
+            <a:r>
+              <a:rPr lang="en-GB" sz="1600" dirty="0" smtClean="0"/>
+              <a:t>tree</a:t>
+            </a:r>
+          </a:p>
+          <a:p>
+            <a:r>
+              <a:rPr lang="en-GB" sz="1600" b="1" dirty="0" smtClean="0">
+                <a:solidFill>
+                  <a:srgbClr val="00B050"/>
+                </a:solidFill>
+              </a:rPr>
+              <a:t>Drawbacks</a:t>
+            </a:r>
+            <a:r>
+              <a:rPr lang="en-GB" sz="1600" dirty="0" smtClean="0"/>
+              <a:t> – Methods implementations need to be duplicated in the derived type (i.e. less code reuse). This drawback can be avoided by using </a:t>
+            </a:r>
+            <a:r>
+              <a:rPr lang="en-GB" sz="1600" b="1" dirty="0" smtClean="0"/>
+              <a:t>traits, </a:t>
+            </a:r>
+            <a:r>
+              <a:rPr lang="en-GB" sz="1600" b="1" dirty="0" err="1" smtClean="0"/>
+              <a:t>mixins</a:t>
+            </a:r>
+            <a:r>
+              <a:rPr lang="en-GB" sz="1600" b="1" dirty="0" smtClean="0"/>
+              <a:t> or protocol extensions</a:t>
+            </a:r>
+            <a:endParaRPr lang="en-GB" sz="1600" b="1" dirty="0"/>
+          </a:p>
+        </p:txBody>
+      </p:sp>
+    </p:spTree>
+    <p:extLst>
+      <p:ext uri="{BB962C8B-B14F-4D97-AF65-F5344CB8AC3E}">
+        <p14:creationId xmlns:p14="http://schemas.microsoft.com/office/powerpoint/2010/main" val="859401601"/>
+      </p:ext>
+    </p:extLst>
+  </p:cSld>
+  <p:clrMapOvr>
+    <a:masterClrMapping/>
+  </p:clrMapOvr>
+  <p:timing>
+    <p:tnLst>
+      <p:par>
+        <p:cTn id="1" dur="indefinite" restart="never" nodeType="tmRoot"/>
+      </p:par>
+    </p:tnLst>
+  </p:timing>
+</p:sld>
+</file>
+
+<file path=ppt/slides/slide13.xml><?xml version="1.0" encoding="utf-8"?>
+<p:sld xmlns:a="http://schemas.openxmlformats.org/drawingml/2006/main" xmlns:r="http://schemas.openxmlformats.org/officeDocument/2006/relationships" xmlns:p="http://schemas.openxmlformats.org/presentationml/2006/main">
+  <p:cSld>
+    <p:spTree>
+      <p:nvGrpSpPr>
+        <p:cNvPr id="1" name=""/>
+        <p:cNvGrpSpPr/>
+        <p:nvPr/>
+      </p:nvGrpSpPr>
+      <p:grpSpPr>
+        <a:xfrm>
+          <a:off x="0" y="0"/>
+          <a:ext cx="0" cy="0"/>
+          <a:chOff x="0" y="0"/>
+          <a:chExt cx="0" cy="0"/>
+        </a:xfrm>
+      </p:grpSpPr>
+      <p:sp>
+        <p:nvSpPr>
+          <p:cNvPr id="2" name="Title 1"/>
+          <p:cNvSpPr>
+            <a:spLocks noGrp="1"/>
+          </p:cNvSpPr>
+          <p:nvPr>
+            <p:ph type="title"/>
+          </p:nvPr>
+        </p:nvSpPr>
+        <p:spPr/>
+        <p:txBody>
+          <a:bodyPr/>
+          <a:lstStyle/>
+          <a:p>
+            <a:r>
+              <a:rPr lang="en-US" dirty="0" smtClean="0"/>
+              <a:t>References</a:t>
+            </a:r>
+            <a:endParaRPr lang="en-US" dirty="0"/>
+          </a:p>
+        </p:txBody>
+      </p:sp>
+      <p:sp>
+        <p:nvSpPr>
+          <p:cNvPr id="3" name="Content Placeholder 2"/>
+          <p:cNvSpPr>
+            <a:spLocks noGrp="1"/>
+          </p:cNvSpPr>
+          <p:nvPr>
+            <p:ph idx="1"/>
+          </p:nvPr>
+        </p:nvSpPr>
+        <p:spPr/>
+        <p:txBody>
+          <a:bodyPr>
+            <a:normAutofit/>
+          </a:bodyPr>
+          <a:lstStyle/>
+          <a:p>
+            <a:r>
+              <a:rPr lang="en-US" sz="1600" dirty="0">
+                <a:hlinkClick r:id="rId2"/>
+              </a:rPr>
+              <a:t>http://www.javacamp.org/designPattern</a:t>
+            </a:r>
+            <a:r>
+              <a:rPr lang="en-US" sz="1600" dirty="0" smtClean="0">
+                <a:hlinkClick r:id="rId2"/>
+              </a:rPr>
+              <a:t>/</a:t>
+            </a:r>
+            <a:endParaRPr lang="en-US" sz="1600" dirty="0" smtClean="0"/>
+          </a:p>
+          <a:p>
+            <a:r>
+              <a:rPr lang="en-US" sz="1600" dirty="0">
+                <a:hlinkClick r:id="rId3"/>
+              </a:rPr>
+              <a:t>http://www.tutorialspoint.com/design_pattern</a:t>
+            </a:r>
+            <a:r>
+              <a:rPr lang="en-US" sz="1600" dirty="0" smtClean="0">
+                <a:hlinkClick r:id="rId3"/>
+              </a:rPr>
+              <a:t>/</a:t>
+            </a:r>
+            <a:endParaRPr lang="en-US" sz="1600" dirty="0" smtClean="0"/>
+          </a:p>
+          <a:p>
+            <a:r>
+              <a:rPr lang="en-US" sz="1600" dirty="0">
+                <a:hlinkClick r:id="rId4"/>
+              </a:rPr>
+              <a:t>https://springframework.guru/gang-of-four-design-patterns/composite-pattern</a:t>
+            </a:r>
+            <a:r>
+              <a:rPr lang="en-US" sz="1600" dirty="0" smtClean="0">
+                <a:hlinkClick r:id="rId4"/>
+              </a:rPr>
+              <a:t>/</a:t>
+            </a:r>
+            <a:endParaRPr lang="en-US" sz="1600" dirty="0" smtClean="0"/>
+          </a:p>
+          <a:p>
+            <a:r>
+              <a:rPr lang="en-US" sz="1600" dirty="0"/>
+              <a:t>https://en.wikipedia.org/wiki/Composition_over_inheritance</a:t>
+            </a:r>
+            <a:endParaRPr lang="en-US" sz="1600" dirty="0" smtClean="0"/>
+          </a:p>
+        </p:txBody>
+      </p:sp>
+    </p:spTree>
+    <p:extLst>
+      <p:ext uri="{BB962C8B-B14F-4D97-AF65-F5344CB8AC3E}">
+        <p14:creationId xmlns:p14="http://schemas.microsoft.com/office/powerpoint/2010/main" val="924403351"/>
+      </p:ext>
+    </p:extLst>
+  </p:cSld>
+  <p:clrMapOvr>
+    <a:masterClrMapping/>
+  </p:clrMapOvr>
+  <p:timing>
+    <p:tnLst>
+      <p:par>
+        <p:cTn id="1" dur="indefinite" restart="never" nodeType="tmRoot"/>
+      </p:par>
+    </p:tnLst>
+  </p:timing>
+</p:sld>
+</file>
+
 <file path=ppt/slides/slide2.xml><?xml version="1.0" encoding="utf-8"?>
 <p:sld xmlns:a="http://schemas.openxmlformats.org/drawingml/2006/main" xmlns:r="http://schemas.openxmlformats.org/officeDocument/2006/relationships" xmlns:p="http://schemas.openxmlformats.org/presentationml/2006/main">
   <p:cSld>
@@ -3468,7 +4158,7 @@
           <a:p>
             <a:r>
               <a:rPr lang="en-US" dirty="0" smtClean="0"/>
-              <a:t>Design Patterns - Creational</a:t>
+              <a:t>SOLID Principles</a:t>
             </a:r>
             <a:endParaRPr lang="en-US" dirty="0"/>
           </a:p>
@@ -3493,127 +4183,85 @@
           <a:p>
             <a:r>
               <a:rPr lang="en-GB" sz="1600" dirty="0" smtClean="0"/>
-              <a:t>Creational Patterns:</a:t>
-            </a:r>
-          </a:p>
-          <a:p>
-            <a:pPr lvl="1">
-              <a:buFont typeface="Wingdings" panose="05000000000000000000" pitchFamily="2" charset="2"/>
-              <a:buChar char="Ø"/>
+              <a:t>Single </a:t>
+            </a:r>
+            <a:r>
+              <a:rPr lang="en-GB" sz="1600" dirty="0"/>
+              <a:t>Responsibility Principle - a class should have only a single responsibility (i.e. changes to only one part of the software's specification should be able to affect the specification of the class</a:t>
+            </a:r>
+            <a:r>
+              <a:rPr lang="en-GB" sz="1600" dirty="0" smtClean="0"/>
+              <a:t>).</a:t>
+            </a:r>
+          </a:p>
+          <a:p>
+            <a:r>
+              <a:rPr lang="en-GB" sz="1600" dirty="0" smtClean="0"/>
+              <a:t>Open/Close Principle - </a:t>
+            </a:r>
+            <a:r>
+              <a:rPr lang="en-GB" sz="1600" dirty="0"/>
+              <a:t>"software entities … should be open for extension, but closed for modification</a:t>
+            </a:r>
+            <a:r>
+              <a:rPr lang="en-GB" sz="1600" dirty="0" smtClean="0"/>
+              <a:t>.“</a:t>
+            </a:r>
+          </a:p>
+          <a:p>
+            <a:r>
+              <a:rPr lang="en-GB" sz="1600" dirty="0" err="1" smtClean="0"/>
+              <a:t>Liskov</a:t>
+            </a:r>
+            <a:r>
+              <a:rPr lang="en-GB" sz="1600" dirty="0" smtClean="0"/>
+              <a:t> substitution Principle - </a:t>
+            </a:r>
+            <a:r>
+              <a:rPr lang="en-GB" sz="1600" dirty="0"/>
+              <a:t>"objects in a program should be replaceable with instances of their subtypes without altering the correctness of that program." See also </a:t>
+            </a:r>
+            <a:r>
+              <a:rPr lang="en-GB" sz="1600" dirty="0">
+                <a:hlinkClick r:id="rId2" tooltip="Design by contract"/>
+              </a:rPr>
+              <a:t>design by contract</a:t>
+            </a:r>
+            <a:r>
+              <a:rPr lang="en-GB" sz="1600" dirty="0" smtClean="0"/>
+              <a:t>.</a:t>
+            </a:r>
+          </a:p>
+          <a:p>
+            <a:r>
+              <a:rPr lang="en-GB" sz="1600" dirty="0" smtClean="0"/>
+              <a:t>Interface segregation principle - </a:t>
+            </a:r>
+            <a:r>
+              <a:rPr lang="en-GB" sz="1600" dirty="0"/>
+              <a:t>"many client-specific interfaces are better than one general-purpose interface</a:t>
+            </a:r>
+            <a:r>
+              <a:rPr lang="en-GB" sz="1600" dirty="0" smtClean="0"/>
+              <a:t>.“</a:t>
+            </a:r>
+          </a:p>
+          <a:p>
+            <a:r>
+              <a:rPr lang="en-GB" sz="1600" dirty="0" smtClean="0"/>
+              <a:t>Dependency inversion principle - </a:t>
+            </a:r>
+            <a:r>
+              <a:rPr lang="en-GB" sz="1600" dirty="0"/>
+              <a:t>one should "depend upon abstractions, [not] concretions."</a:t>
+            </a:r>
+            <a:endParaRPr lang="en-GB" sz="1600" dirty="0" smtClean="0"/>
+          </a:p>
+          <a:p>
+            <a:pPr marL="274320" lvl="1" indent="0">
+              <a:buNone/>
             </a:pPr>
-            <a:r>
-              <a:rPr lang="en-GB" sz="1400" dirty="0" smtClean="0"/>
-              <a:t>Abstract Factory</a:t>
-            </a:r>
-          </a:p>
-          <a:p>
-            <a:pPr lvl="1">
-              <a:buFont typeface="Wingdings" panose="05000000000000000000" pitchFamily="2" charset="2"/>
-              <a:buChar char="Ø"/>
-            </a:pPr>
-            <a:r>
-              <a:rPr lang="en-GB" sz="1400" dirty="0" smtClean="0"/>
-              <a:t>Builder</a:t>
-            </a:r>
-          </a:p>
-          <a:p>
-            <a:pPr lvl="1">
-              <a:buFont typeface="Wingdings" panose="05000000000000000000" pitchFamily="2" charset="2"/>
-              <a:buChar char="Ø"/>
-            </a:pPr>
-            <a:r>
-              <a:rPr lang="en-GB" sz="1400" dirty="0" smtClean="0"/>
-              <a:t>Factory Method</a:t>
-            </a:r>
-          </a:p>
-          <a:p>
-            <a:pPr lvl="1">
-              <a:buFont typeface="Wingdings" panose="05000000000000000000" pitchFamily="2" charset="2"/>
-              <a:buChar char="Ø"/>
-            </a:pPr>
-            <a:r>
-              <a:rPr lang="en-GB" sz="1400" dirty="0" smtClean="0"/>
-              <a:t>Prototype</a:t>
-            </a:r>
-          </a:p>
-          <a:p>
-            <a:pPr lvl="1">
-              <a:buFont typeface="Wingdings" panose="05000000000000000000" pitchFamily="2" charset="2"/>
-              <a:buChar char="Ø"/>
-            </a:pPr>
-            <a:r>
-              <a:rPr lang="en-GB" sz="1400" dirty="0" smtClean="0"/>
-              <a:t>Singleton</a:t>
-            </a:r>
-            <a:endParaRPr lang="en-GB" sz="1400" dirty="0"/>
-          </a:p>
-          <a:p>
-            <a:r>
-              <a:rPr lang="en-GB" sz="1600" dirty="0" smtClean="0"/>
-              <a:t>Structural Patterns</a:t>
-            </a:r>
-            <a:r>
-              <a:rPr lang="en-GB" sz="1600" dirty="0"/>
-              <a:t>:</a:t>
-            </a:r>
-          </a:p>
-          <a:p>
-            <a:pPr lvl="1">
-              <a:buFont typeface="Wingdings" panose="05000000000000000000" pitchFamily="2" charset="2"/>
-              <a:buChar char="Ø"/>
-            </a:pPr>
-            <a:r>
-              <a:rPr lang="en-GB" sz="1400" dirty="0" smtClean="0"/>
-              <a:t>Adaptor</a:t>
-            </a:r>
-            <a:endParaRPr lang="en-GB" sz="1400" dirty="0"/>
-          </a:p>
-          <a:p>
-            <a:pPr lvl="1">
-              <a:buFont typeface="Wingdings" panose="05000000000000000000" pitchFamily="2" charset="2"/>
-              <a:buChar char="Ø"/>
-            </a:pPr>
-            <a:r>
-              <a:rPr lang="en-GB" sz="1400" dirty="0" smtClean="0"/>
-              <a:t>Bridge</a:t>
-            </a:r>
-            <a:endParaRPr lang="en-GB" sz="1400" dirty="0"/>
-          </a:p>
-          <a:p>
-            <a:pPr lvl="1">
-              <a:buFont typeface="Wingdings" panose="05000000000000000000" pitchFamily="2" charset="2"/>
-              <a:buChar char="Ø"/>
-            </a:pPr>
-            <a:r>
-              <a:rPr lang="en-GB" sz="1400" dirty="0"/>
-              <a:t>Factory Method</a:t>
-            </a:r>
-          </a:p>
-          <a:p>
-            <a:pPr lvl="1">
-              <a:buFont typeface="Wingdings" panose="05000000000000000000" pitchFamily="2" charset="2"/>
-              <a:buChar char="Ø"/>
-            </a:pPr>
-            <a:r>
-              <a:rPr lang="en-GB" sz="1400" dirty="0"/>
-              <a:t>Prototype</a:t>
-            </a:r>
-          </a:p>
-          <a:p>
-            <a:pPr lvl="1">
-              <a:buFont typeface="Wingdings" panose="05000000000000000000" pitchFamily="2" charset="2"/>
-              <a:buChar char="Ø"/>
-            </a:pPr>
-            <a:r>
-              <a:rPr lang="en-GB" sz="1400" dirty="0"/>
-              <a:t>Singleton</a:t>
-            </a:r>
-          </a:p>
-          <a:p>
-            <a:pPr marL="274320" lvl="1" indent="0">
-              <a:buNone/>
-            </a:pPr>
-            <a:endParaRPr lang="en-GB" sz="1400" dirty="0"/>
+            <a:endParaRPr lang="en-GB" sz="1400" dirty="0" smtClean="0"/>
           </a:p>
           <a:p>
             <a:pPr marL="274320" lvl="1" indent="0">
@@ -3683,7 +4331,7 @@
           <a:p>
             <a:r>
               <a:rPr lang="en-US" dirty="0" smtClean="0"/>
-              <a:t>Design Patterns - Structural</a:t>
+              <a:t>Design Patterns - Creational</a:t>
             </a:r>
             <a:endParaRPr lang="en-US" dirty="0"/>
           </a:p>
@@ -3708,11 +4356,7 @@
           <a:p>
             <a:r>
               <a:rPr lang="en-GB" sz="1600" dirty="0" smtClean="0"/>
-              <a:t>Structural Patterns</a:t>
-            </a:r>
-            <a:r>
-              <a:rPr lang="en-GB" sz="1600" dirty="0"/>
-              <a:t>:</a:t>
+              <a:t>Creational Patterns:</a:t>
             </a:r>
           </a:p>
           <a:p>
@@ -3722,9 +4366,8 @@
             </a:pPr>
             <a:r>
               <a:rPr lang="en-GB" sz="1400" dirty="0" smtClean="0"/>
-              <a:t>Adaptor</a:t>
-            </a:r>
-            <a:endParaRPr lang="en-GB" sz="1400" dirty="0"/>
+              <a:t>Abstract Factory</a:t>
+            </a:r>
           </a:p>
           <a:p>
             <a:pPr lvl="1">
@@ -3733,9 +4376,8 @@
             </a:pPr>
             <a:r>
               <a:rPr lang="en-GB" sz="1400" dirty="0" smtClean="0"/>
-              <a:t>Bridge</a:t>
-            </a:r>
-            <a:endParaRPr lang="en-GB" sz="1400" dirty="0"/>
+              <a:t>Builder</a:t>
+            </a:r>
           </a:p>
           <a:p>
             <a:pPr lvl="1">
@@ -3744,9 +4386,8 @@
             </a:pPr>
             <a:r>
               <a:rPr lang="en-GB" sz="1400" dirty="0" smtClean="0"/>
-              <a:t>Composite</a:t>
-            </a:r>
-            <a:endParaRPr lang="en-GB" sz="1400" dirty="0"/>
+              <a:t>Factory Method</a:t>
+            </a:r>
           </a:p>
           <a:p>
             <a:pPr lvl="1">
@@ -3755,9 +4396,8 @@
             </a:pPr>
             <a:r>
               <a:rPr lang="en-GB" sz="1400" dirty="0" smtClean="0"/>
-              <a:t>Decorator</a:t>
-            </a:r>
-            <a:endParaRPr lang="en-GB" sz="1400" dirty="0"/>
+              <a:t>Prototype</a:t>
+            </a:r>
           </a:p>
           <a:p>
             <a:pPr lvl="1">
@@ -3766,7 +4406,18 @@
             </a:pPr>
             <a:r>
               <a:rPr lang="en-GB" sz="1400" dirty="0" smtClean="0"/>
-              <a:t>Façade</a:t>
+              <a:t>Singleton</a:t>
+            </a:r>
+            <a:endParaRPr lang="en-GB" sz="1400" dirty="0"/>
+          </a:p>
+          <a:p>
+            <a:r>
+              <a:rPr lang="en-GB" sz="1600" dirty="0" smtClean="0"/>
+              <a:t>Structural Patterns</a:t>
+            </a:r>
+            <a:r>
+              <a:rPr lang="en-GB" sz="1600" dirty="0"/>
+              <a:t>:</a:t>
             </a:r>
           </a:p>
           <a:p>
@@ -3776,8 +4427,9 @@
             </a:pPr>
             <a:r>
               <a:rPr lang="en-GB" sz="1400" dirty="0" smtClean="0"/>
-              <a:t>Flyweight</a:t>
-            </a:r>
+              <a:t>Adaptor</a:t>
+            </a:r>
+            <a:endParaRPr lang="en-GB" sz="1400" dirty="0"/>
           </a:p>
           <a:p>
             <a:pPr lvl="1">
@@ -3786,9 +4438,39 @@
             </a:pPr>
             <a:r>
               <a:rPr lang="en-GB" sz="1400" dirty="0" smtClean="0"/>
-              <a:t>Proxy</a:t>
+              <a:t>Bridge</a:t>
             </a:r>
             <a:endParaRPr lang="en-GB" sz="1400" dirty="0"/>
+          </a:p>
+          <a:p>
+            <a:pPr lvl="1">
+              <a:buFont typeface="Wingdings" panose="05000000000000000000" pitchFamily="2" charset="2"/>
+              <a:buChar char="Ø"/>
+            </a:pPr>
+            <a:r>
+              <a:rPr lang="en-GB" sz="1400" dirty="0"/>
+              <a:t>Factory Method</a:t>
+            </a:r>
+          </a:p>
+          <a:p>
+            <a:pPr lvl="1">
+              <a:buFont typeface="Wingdings" panose="05000000000000000000" pitchFamily="2" charset="2"/>
+              <a:buChar char="Ø"/>
+            </a:pPr>
+            <a:r>
+              <a:rPr lang="en-GB" sz="1400" dirty="0"/>
+              <a:t>Prototype</a:t>
+            </a:r>
+          </a:p>
+          <a:p>
+            <a:pPr lvl="1">
+              <a:buFont typeface="Wingdings" panose="05000000000000000000" pitchFamily="2" charset="2"/>
+              <a:buChar char="Ø"/>
+            </a:pPr>
+            <a:r>
+              <a:rPr lang="en-GB" sz="1400" dirty="0"/>
+              <a:t>Singleton</a:t>
+            </a:r>
           </a:p>
           <a:p>
             <a:pPr marL="274320" lvl="1" indent="0">
@@ -3807,7 +4489,7 @@
     </p:spTree>
     <p:extLst>
       <p:ext uri="{BB962C8B-B14F-4D97-AF65-F5344CB8AC3E}">
-        <p14:creationId xmlns:p14="http://schemas.microsoft.com/office/powerpoint/2010/main" val="1243498078"/>
+        <p14:creationId xmlns:p14="http://schemas.microsoft.com/office/powerpoint/2010/main" val="173896342"/>
       </p:ext>
     </p:extLst>
   </p:cSld>
@@ -3864,7 +4546,7 @@
           <a:p>
             <a:r>
               <a:rPr lang="en-US" dirty="0" smtClean="0"/>
-              <a:t>Design Patterns - Behavioral</a:t>
+              <a:t>Design Patterns - Structural</a:t>
             </a:r>
             <a:endParaRPr lang="en-US" dirty="0"/>
           </a:p>
@@ -3889,7 +4571,7 @@
           <a:p>
             <a:r>
               <a:rPr lang="en-GB" sz="1600" dirty="0" smtClean="0"/>
-              <a:t>Behavioral Patterns</a:t>
+              <a:t>Structural Patterns</a:t>
             </a:r>
             <a:r>
               <a:rPr lang="en-GB" sz="1600" dirty="0"/>
@@ -3903,7 +4585,7 @@
             </a:pPr>
             <a:r>
               <a:rPr lang="en-GB" sz="1400" dirty="0" smtClean="0"/>
-              <a:t>Chain of Responsibility</a:t>
+              <a:t>Adaptor</a:t>
             </a:r>
             <a:endParaRPr lang="en-GB" sz="1400" dirty="0"/>
           </a:p>
@@ -3914,7 +4596,7 @@
             </a:pPr>
             <a:r>
               <a:rPr lang="en-GB" sz="1400" dirty="0" smtClean="0"/>
-              <a:t>Command</a:t>
+              <a:t>Bridge</a:t>
             </a:r>
             <a:endParaRPr lang="en-GB" sz="1400" dirty="0"/>
           </a:p>
@@ -3925,7 +4607,7 @@
             </a:pPr>
             <a:r>
               <a:rPr lang="en-GB" sz="1400" dirty="0" smtClean="0"/>
-              <a:t>Interpreter</a:t>
+              <a:t>Composite</a:t>
             </a:r>
             <a:endParaRPr lang="en-GB" sz="1400" dirty="0"/>
           </a:p>
@@ -3936,7 +4618,7 @@
             </a:pPr>
             <a:r>
               <a:rPr lang="en-GB" sz="1400" dirty="0" smtClean="0"/>
-              <a:t>Mediator</a:t>
+              <a:t>Decorator</a:t>
             </a:r>
             <a:endParaRPr lang="en-GB" sz="1400" dirty="0"/>
           </a:p>
@@ -3947,7 +4629,7 @@
             </a:pPr>
             <a:r>
               <a:rPr lang="en-GB" sz="1400" dirty="0" smtClean="0"/>
-              <a:t>Memento</a:t>
+              <a:t>Façade</a:t>
             </a:r>
           </a:p>
           <a:p>
@@ -3957,7 +4639,7 @@
             </a:pPr>
             <a:r>
               <a:rPr lang="en-GB" sz="1400" dirty="0" smtClean="0"/>
-              <a:t>Observer</a:t>
+              <a:t>Flyweight</a:t>
             </a:r>
           </a:p>
           <a:p>
@@ -3967,37 +4649,7 @@
             </a:pPr>
             <a:r>
               <a:rPr lang="en-GB" sz="1400" dirty="0" smtClean="0"/>
-              <a:t>State</a:t>
-            </a:r>
-          </a:p>
-          <a:p>
-            <a:pPr lvl="1">
-              <a:buFont typeface="Wingdings" panose="05000000000000000000" pitchFamily="2" charset="2"/>
-              <a:buChar char="Ø"/>
-            </a:pPr>
-            <a:r>
-              <a:rPr lang="en-GB" sz="1400" dirty="0" smtClean="0"/>
-              <a:t>Strategy</a:t>
-            </a:r>
-          </a:p>
-          <a:p>
-            <a:pPr lvl="1">
-              <a:buFont typeface="Wingdings" panose="05000000000000000000" pitchFamily="2" charset="2"/>
-              <a:buChar char="Ø"/>
-            </a:pPr>
-            <a:r>
-              <a:rPr lang="en-GB" sz="1400" dirty="0" smtClean="0"/>
-              <a:t>Template Method</a:t>
-            </a:r>
-          </a:p>
-          <a:p>
-            <a:pPr lvl="1">
-              <a:buFont typeface="Wingdings" panose="05000000000000000000" pitchFamily="2" charset="2"/>
-              <a:buChar char="Ø"/>
-            </a:pPr>
-            <a:r>
-              <a:rPr lang="en-GB" sz="1400" dirty="0" smtClean="0"/>
-              <a:t>Visitor</a:t>
+              <a:t>Proxy</a:t>
             </a:r>
             <a:endParaRPr lang="en-GB" sz="1400" dirty="0"/>
           </a:p>
@@ -4018,7 +4670,7 @@
     </p:spTree>
     <p:extLst>
       <p:ext uri="{BB962C8B-B14F-4D97-AF65-F5344CB8AC3E}">
-        <p14:creationId xmlns:p14="http://schemas.microsoft.com/office/powerpoint/2010/main" val="3858580364"/>
+        <p14:creationId xmlns:p14="http://schemas.microsoft.com/office/powerpoint/2010/main" val="1243498078"/>
       </p:ext>
     </p:extLst>
   </p:cSld>
@@ -4075,7 +4727,7 @@
           <a:p>
             <a:r>
               <a:rPr lang="en-US" dirty="0" smtClean="0"/>
-              <a:t>Design Patterns – J2EE Patterns</a:t>
+              <a:t>Design Patterns - Behavioral</a:t>
             </a:r>
             <a:endParaRPr lang="en-US" dirty="0"/>
           </a:p>
@@ -4100,7 +4752,7 @@
           <a:p>
             <a:r>
               <a:rPr lang="en-GB" sz="1600" dirty="0" smtClean="0"/>
-              <a:t>J2EE Patterns</a:t>
+              <a:t>Behavioral Patterns</a:t>
             </a:r>
             <a:r>
               <a:rPr lang="en-GB" sz="1600" dirty="0"/>
@@ -4114,7 +4766,7 @@
             </a:pPr>
             <a:r>
               <a:rPr lang="en-GB" sz="1400" dirty="0" smtClean="0"/>
-              <a:t>MVC</a:t>
+              <a:t>Chain of Responsibility</a:t>
             </a:r>
             <a:endParaRPr lang="en-GB" sz="1400" dirty="0"/>
           </a:p>
@@ -4125,7 +4777,7 @@
             </a:pPr>
             <a:r>
               <a:rPr lang="en-GB" sz="1400" dirty="0" smtClean="0"/>
-              <a:t>Business Delegate</a:t>
+              <a:t>Command</a:t>
             </a:r>
             <a:endParaRPr lang="en-GB" sz="1400" dirty="0"/>
           </a:p>
@@ -4136,7 +4788,7 @@
             </a:pPr>
             <a:r>
               <a:rPr lang="en-GB" sz="1400" dirty="0" smtClean="0"/>
-              <a:t>Composite Entity</a:t>
+              <a:t>Interpreter</a:t>
             </a:r>
             <a:endParaRPr lang="en-GB" sz="1400" dirty="0"/>
           </a:p>
@@ -4147,7 +4799,7 @@
             </a:pPr>
             <a:r>
               <a:rPr lang="en-GB" sz="1400" dirty="0" smtClean="0"/>
-              <a:t>Data Access Object</a:t>
+              <a:t>Mediator</a:t>
             </a:r>
             <a:endParaRPr lang="en-GB" sz="1400" dirty="0"/>
           </a:p>
@@ -4158,7 +4810,7 @@
             </a:pPr>
             <a:r>
               <a:rPr lang="en-GB" sz="1400" dirty="0" smtClean="0"/>
-              <a:t>Front Controller</a:t>
+              <a:t>Memento</a:t>
             </a:r>
           </a:p>
           <a:p>
@@ -4168,7 +4820,7 @@
             </a:pPr>
             <a:r>
               <a:rPr lang="en-GB" sz="1400" dirty="0" smtClean="0"/>
-              <a:t>Intercepting Filter</a:t>
+              <a:t>Observer</a:t>
             </a:r>
           </a:p>
           <a:p>
@@ -4178,7 +4830,7 @@
             </a:pPr>
             <a:r>
               <a:rPr lang="en-GB" sz="1400" dirty="0" smtClean="0"/>
-              <a:t>Service Locator</a:t>
+              <a:t>State</a:t>
             </a:r>
           </a:p>
           <a:p>
@@ -4188,8 +4840,29 @@
             </a:pPr>
             <a:r>
               <a:rPr lang="en-GB" sz="1400" dirty="0" smtClean="0"/>
-              <a:t>Transfer Object</a:t>
-            </a:r>
+              <a:t>Strategy</a:t>
+            </a:r>
+          </a:p>
+          <a:p>
+            <a:pPr lvl="1">
+              <a:buFont typeface="Wingdings" panose="05000000000000000000" pitchFamily="2" charset="2"/>
+              <a:buChar char="Ø"/>
+            </a:pPr>
+            <a:r>
+              <a:rPr lang="en-GB" sz="1400" dirty="0" smtClean="0"/>
+              <a:t>Template Method</a:t>
+            </a:r>
+          </a:p>
+          <a:p>
+            <a:pPr lvl="1">
+              <a:buFont typeface="Wingdings" panose="05000000000000000000" pitchFamily="2" charset="2"/>
+              <a:buChar char="Ø"/>
+            </a:pPr>
+            <a:r>
+              <a:rPr lang="en-GB" sz="1400" dirty="0" smtClean="0"/>
+              <a:t>Visitor</a:t>
+            </a:r>
+            <a:endParaRPr lang="en-GB" sz="1400" dirty="0"/>
           </a:p>
           <a:p>
             <a:pPr marL="274320" lvl="1" indent="0">
@@ -4208,7 +4881,7 @@
     </p:spTree>
     <p:extLst>
       <p:ext uri="{BB962C8B-B14F-4D97-AF65-F5344CB8AC3E}">
-        <p14:creationId xmlns:p14="http://schemas.microsoft.com/office/powerpoint/2010/main" val="3356585662"/>
+        <p14:creationId xmlns:p14="http://schemas.microsoft.com/office/powerpoint/2010/main" val="3858580364"/>
       </p:ext>
     </p:extLst>
   </p:cSld>
@@ -4265,6 +4938,196 @@
           <a:p>
             <a:r>
               <a:rPr lang="en-US" dirty="0" smtClean="0"/>
+              <a:t>Design Patterns – J2EE Patterns</a:t>
+            </a:r>
+            <a:endParaRPr lang="en-US" dirty="0"/>
+          </a:p>
+        </p:txBody>
+      </p:sp>
+      <p:sp>
+        <p:nvSpPr>
+          <p:cNvPr id="3" name="Content Placeholder 2"/>
+          <p:cNvSpPr>
+            <a:spLocks noGrp="1"/>
+          </p:cNvSpPr>
+          <p:nvPr>
+            <p:ph idx="1"/>
+          </p:nvPr>
+        </p:nvSpPr>
+        <p:spPr/>
+        <p:txBody>
+          <a:bodyPr>
+            <a:normAutofit/>
+          </a:bodyPr>
+          <a:lstStyle/>
+          <a:p>
+            <a:r>
+              <a:rPr lang="en-GB" sz="1600" dirty="0" smtClean="0"/>
+              <a:t>J2EE Patterns</a:t>
+            </a:r>
+            <a:r>
+              <a:rPr lang="en-GB" sz="1600" dirty="0"/>
+              <a:t>:</a:t>
+            </a:r>
+          </a:p>
+          <a:p>
+            <a:pPr lvl="1">
+              <a:buFont typeface="Wingdings" panose="05000000000000000000" pitchFamily="2" charset="2"/>
+              <a:buChar char="Ø"/>
+            </a:pPr>
+            <a:r>
+              <a:rPr lang="en-GB" sz="1400" dirty="0" smtClean="0"/>
+              <a:t>MVC</a:t>
+            </a:r>
+            <a:endParaRPr lang="en-GB" sz="1400" dirty="0"/>
+          </a:p>
+          <a:p>
+            <a:pPr lvl="1">
+              <a:buFont typeface="Wingdings" panose="05000000000000000000" pitchFamily="2" charset="2"/>
+              <a:buChar char="Ø"/>
+            </a:pPr>
+            <a:r>
+              <a:rPr lang="en-GB" sz="1400" dirty="0" smtClean="0"/>
+              <a:t>Business Delegate</a:t>
+            </a:r>
+            <a:endParaRPr lang="en-GB" sz="1400" dirty="0"/>
+          </a:p>
+          <a:p>
+            <a:pPr lvl="1">
+              <a:buFont typeface="Wingdings" panose="05000000000000000000" pitchFamily="2" charset="2"/>
+              <a:buChar char="Ø"/>
+            </a:pPr>
+            <a:r>
+              <a:rPr lang="en-GB" sz="1400" dirty="0" smtClean="0"/>
+              <a:t>Composite Entity</a:t>
+            </a:r>
+            <a:endParaRPr lang="en-GB" sz="1400" dirty="0"/>
+          </a:p>
+          <a:p>
+            <a:pPr lvl="1">
+              <a:buFont typeface="Wingdings" panose="05000000000000000000" pitchFamily="2" charset="2"/>
+              <a:buChar char="Ø"/>
+            </a:pPr>
+            <a:r>
+              <a:rPr lang="en-GB" sz="1400" dirty="0" smtClean="0"/>
+              <a:t>Data Access Object</a:t>
+            </a:r>
+            <a:endParaRPr lang="en-GB" sz="1400" dirty="0"/>
+          </a:p>
+          <a:p>
+            <a:pPr lvl="1">
+              <a:buFont typeface="Wingdings" panose="05000000000000000000" pitchFamily="2" charset="2"/>
+              <a:buChar char="Ø"/>
+            </a:pPr>
+            <a:r>
+              <a:rPr lang="en-GB" sz="1400" dirty="0" smtClean="0"/>
+              <a:t>Front Controller</a:t>
+            </a:r>
+          </a:p>
+          <a:p>
+            <a:pPr lvl="1">
+              <a:buFont typeface="Wingdings" panose="05000000000000000000" pitchFamily="2" charset="2"/>
+              <a:buChar char="Ø"/>
+            </a:pPr>
+            <a:r>
+              <a:rPr lang="en-GB" sz="1400" dirty="0" smtClean="0"/>
+              <a:t>Intercepting Filter</a:t>
+            </a:r>
+          </a:p>
+          <a:p>
+            <a:pPr lvl="1">
+              <a:buFont typeface="Wingdings" panose="05000000000000000000" pitchFamily="2" charset="2"/>
+              <a:buChar char="Ø"/>
+            </a:pPr>
+            <a:r>
+              <a:rPr lang="en-GB" sz="1400" dirty="0" smtClean="0"/>
+              <a:t>Service Locator</a:t>
+            </a:r>
+          </a:p>
+          <a:p>
+            <a:pPr lvl="1">
+              <a:buFont typeface="Wingdings" panose="05000000000000000000" pitchFamily="2" charset="2"/>
+              <a:buChar char="Ø"/>
+            </a:pPr>
+            <a:r>
+              <a:rPr lang="en-GB" sz="1400" dirty="0" smtClean="0"/>
+              <a:t>Transfer Object</a:t>
+            </a:r>
+          </a:p>
+          <a:p>
+            <a:pPr marL="274320" lvl="1" indent="0">
+              <a:buNone/>
+            </a:pPr>
+            <a:endParaRPr lang="en-GB" sz="1400" dirty="0"/>
+          </a:p>
+          <a:p>
+            <a:pPr marL="274320" lvl="1" indent="0">
+              <a:buNone/>
+            </a:pPr>
+            <a:endParaRPr lang="en-GB" sz="1400" dirty="0"/>
+          </a:p>
+        </p:txBody>
+      </p:sp>
+    </p:spTree>
+    <p:extLst>
+      <p:ext uri="{BB962C8B-B14F-4D97-AF65-F5344CB8AC3E}">
+        <p14:creationId xmlns:p14="http://schemas.microsoft.com/office/powerpoint/2010/main" val="3356585662"/>
+      </p:ext>
+    </p:extLst>
+  </p:cSld>
+  <p:clrMapOvr>
+    <a:masterClrMapping/>
+  </p:clrMapOvr>
+  <p:timing>
+    <p:tnLst>
+      <p:par>
+        <p:cTn id="1" dur="indefinite" restart="never" nodeType="tmRoot"/>
+      </p:par>
+    </p:tnLst>
+  </p:timing>
+</p:sld>
+</file>
+
+<file path=ppt/slides/slide7.xml><?xml version="1.0" encoding="utf-8"?>
+<p:sld xmlns:a="http://schemas.openxmlformats.org/drawingml/2006/main" xmlns:r="http://schemas.openxmlformats.org/officeDocument/2006/relationships" xmlns:p="http://schemas.openxmlformats.org/presentationml/2006/main">
+  <p:cSld>
+    <p:bg>
+      <p:bgPr>
+        <a:noFill/>
+        <a:effectLst/>
+      </p:bgPr>
+    </p:bg>
+    <p:spTree>
+      <p:nvGrpSpPr>
+        <p:cNvPr id="1" name=""/>
+        <p:cNvGrpSpPr/>
+        <p:nvPr/>
+      </p:nvGrpSpPr>
+      <p:grpSpPr>
+        <a:xfrm>
+          <a:off x="0" y="0"/>
+          <a:ext cx="0" cy="0"/>
+          <a:chOff x="0" y="0"/>
+          <a:chExt cx="0" cy="0"/>
+        </a:xfrm>
+      </p:grpSpPr>
+      <p:sp>
+        <p:nvSpPr>
+          <p:cNvPr id="2" name="Title 1"/>
+          <p:cNvSpPr>
+            <a:spLocks noGrp="1"/>
+          </p:cNvSpPr>
+          <p:nvPr>
+            <p:ph type="title"/>
+          </p:nvPr>
+        </p:nvSpPr>
+        <p:spPr/>
+        <p:txBody>
+          <a:bodyPr/>
+          <a:lstStyle/>
+          <a:p>
+            <a:r>
+              <a:rPr lang="en-US" dirty="0" smtClean="0"/>
               <a:t>Design Patterns – Misc.</a:t>
             </a:r>
             <a:endParaRPr lang="en-US" dirty="0"/>
@@ -4352,9 +5215,15 @@
 </p:sld>
 </file>
 
-<file path=ppt/slides/slide7.xml><?xml version="1.0" encoding="utf-8"?>
+<file path=ppt/slides/slide8.xml><?xml version="1.0" encoding="utf-8"?>
 <p:sld xmlns:a="http://schemas.openxmlformats.org/drawingml/2006/main" xmlns:r="http://schemas.openxmlformats.org/officeDocument/2006/relationships" xmlns:p="http://schemas.openxmlformats.org/presentationml/2006/main">
   <p:cSld>
+    <p:bg>
+      <p:bgPr>
+        <a:noFill/>
+        <a:effectLst/>
+      </p:bgPr>
+    </p:bg>
     <p:spTree>
       <p:nvGrpSpPr>
         <p:cNvPr id="1" name=""/>
@@ -4381,61 +5250,225 @@
         </p:nvSpPr>
         <p:spPr/>
         <p:txBody>
-          <a:bodyPr/>
-          <a:lstStyle/>
-          <a:p>
-            <a:r>
-              <a:rPr lang="en-US" dirty="0" smtClean="0"/>
-              <a:t>References</a:t>
-            </a:r>
-            <a:endParaRPr lang="en-US" dirty="0"/>
-          </a:p>
-        </p:txBody>
-      </p:sp>
-      <p:sp>
-        <p:nvSpPr>
-          <p:cNvPr id="3" name="Content Placeholder 2"/>
-          <p:cNvSpPr>
-            <a:spLocks noGrp="1"/>
-          </p:cNvSpPr>
-          <p:nvPr>
-            <p:ph idx="1"/>
-          </p:nvPr>
-        </p:nvSpPr>
-        <p:spPr/>
-        <p:txBody>
           <a:bodyPr>
             <a:normAutofit/>
           </a:bodyPr>
           <a:lstStyle/>
           <a:p>
             <a:r>
-              <a:rPr lang="en-US" sz="1600" dirty="0">
-                <a:hlinkClick r:id="rId2"/>
+              <a:rPr lang="en-US" dirty="0" smtClean="0"/>
+              <a:t>Decorator Pattern – Structural </a:t>
+            </a:r>
+            <a:endParaRPr lang="en-US" dirty="0"/>
+          </a:p>
+        </p:txBody>
+      </p:sp>
+      <p:sp>
+        <p:nvSpPr>
+          <p:cNvPr id="3" name="Content Placeholder 2"/>
+          <p:cNvSpPr>
+            <a:spLocks noGrp="1"/>
+          </p:cNvSpPr>
+          <p:nvPr>
+            <p:ph idx="1"/>
+          </p:nvPr>
+        </p:nvSpPr>
+        <p:spPr/>
+        <p:txBody>
+          <a:bodyPr>
+            <a:normAutofit/>
+          </a:bodyPr>
+          <a:lstStyle/>
+          <a:p>
+            <a:r>
+              <a:rPr lang="en-GB" sz="1600" dirty="0" smtClean="0"/>
+              <a:t>Add/attach new responsibilities to objects </a:t>
+            </a:r>
+            <a:r>
+              <a:rPr lang="en-GB" sz="1600" b="1" dirty="0" smtClean="0"/>
+              <a:t>dynamically</a:t>
+            </a:r>
+            <a:r>
+              <a:rPr lang="en-GB" sz="1600" dirty="0" smtClean="0"/>
+              <a:t> using composition</a:t>
+            </a:r>
+          </a:p>
+          <a:p>
+            <a:r>
+              <a:rPr lang="en-GB" sz="1600" dirty="0" smtClean="0"/>
+              <a:t>Example:- </a:t>
+            </a:r>
+            <a:r>
+              <a:rPr lang="en-GB" sz="1600" dirty="0" err="1" smtClean="0"/>
+              <a:t>FloorBouquet</a:t>
+            </a:r>
+            <a:r>
+              <a:rPr lang="en-GB" sz="1600" dirty="0" smtClean="0"/>
+              <a:t> decoration </a:t>
+            </a:r>
+          </a:p>
+          <a:p>
+            <a:r>
+              <a:rPr lang="en-GB" sz="1400" dirty="0"/>
+              <a:t>When you inherit functionality through </a:t>
+            </a:r>
+            <a:r>
+              <a:rPr lang="en-GB" sz="1400" dirty="0" err="1"/>
+              <a:t>subclassing</a:t>
+            </a:r>
+            <a:r>
+              <a:rPr lang="en-GB" sz="1400" dirty="0"/>
+              <a:t>, the functionality is </a:t>
+            </a:r>
+            <a:r>
+              <a:rPr lang="en-GB" sz="1400" dirty="0">
+                <a:solidFill>
+                  <a:srgbClr val="FF0000"/>
+                </a:solidFill>
               </a:rPr>
-              <a:t>http://www.javacamp.org/designPattern</a:t>
-            </a:r>
-            <a:r>
-              <a:rPr lang="en-US" sz="1600" dirty="0" smtClean="0">
-                <a:hlinkClick r:id="rId2"/>
+              <a:t>statically</a:t>
+            </a:r>
+            <a:r>
+              <a:rPr lang="en-GB" sz="1400" dirty="0"/>
+              <a:t> set at compile time and it doesn’t always lead to the most flexible nor maintainable designs. If you need to add new features, code modifications are required, which is a violation of the </a:t>
+            </a:r>
+            <a:r>
+              <a:rPr lang="en-GB" sz="1400" dirty="0">
+                <a:hlinkClick r:id="rId2" tooltip="Open Closed Principle"/>
               </a:rPr>
-              <a:t>/</a:t>
-            </a:r>
-            <a:endParaRPr lang="en-US" sz="1600" dirty="0" smtClean="0"/>
-          </a:p>
-          <a:p>
-            <a:r>
-              <a:rPr lang="en-US" sz="1600" dirty="0"/>
-              <a:t>http://www.tutorialspoint.com/design_pattern/</a:t>
-            </a:r>
-            <a:endParaRPr lang="en-US" sz="1600" dirty="0" smtClean="0"/>
+              <a:t>Open Closed Principle</a:t>
+            </a:r>
+            <a:r>
+              <a:rPr lang="en-GB" sz="1400" dirty="0"/>
+              <a:t>.</a:t>
+            </a:r>
+            <a:endParaRPr lang="en-GB" sz="1400" dirty="0"/>
           </a:p>
         </p:txBody>
       </p:sp>
     </p:spTree>
     <p:extLst>
       <p:ext uri="{BB962C8B-B14F-4D97-AF65-F5344CB8AC3E}">
-        <p14:creationId xmlns:p14="http://schemas.microsoft.com/office/powerpoint/2010/main" val="924403351"/>
+        <p14:creationId xmlns:p14="http://schemas.microsoft.com/office/powerpoint/2010/main" val="769906468"/>
+      </p:ext>
+    </p:extLst>
+  </p:cSld>
+  <p:clrMapOvr>
+    <a:masterClrMapping/>
+  </p:clrMapOvr>
+  <p:timing>
+    <p:tnLst>
+      <p:par>
+        <p:cTn id="1" dur="indefinite" restart="never" nodeType="tmRoot"/>
+      </p:par>
+    </p:tnLst>
+  </p:timing>
+</p:sld>
+</file>
+
+<file path=ppt/slides/slide9.xml><?xml version="1.0" encoding="utf-8"?>
+<p:sld xmlns:a="http://schemas.openxmlformats.org/drawingml/2006/main" xmlns:r="http://schemas.openxmlformats.org/officeDocument/2006/relationships" xmlns:p="http://schemas.openxmlformats.org/presentationml/2006/main">
+  <p:cSld>
+    <p:bg>
+      <p:bgPr>
+        <a:noFill/>
+        <a:effectLst/>
+      </p:bgPr>
+    </p:bg>
+    <p:spTree>
+      <p:nvGrpSpPr>
+        <p:cNvPr id="1" name=""/>
+        <p:cNvGrpSpPr/>
+        <p:nvPr/>
+      </p:nvGrpSpPr>
+      <p:grpSpPr>
+        <a:xfrm>
+          <a:off x="0" y="0"/>
+          <a:ext cx="0" cy="0"/>
+          <a:chOff x="0" y="0"/>
+          <a:chExt cx="0" cy="0"/>
+        </a:xfrm>
+      </p:grpSpPr>
+      <p:sp>
+        <p:nvSpPr>
+          <p:cNvPr id="2" name="Title 1"/>
+          <p:cNvSpPr>
+            <a:spLocks noGrp="1"/>
+          </p:cNvSpPr>
+          <p:nvPr>
+            <p:ph type="title"/>
+          </p:nvPr>
+        </p:nvSpPr>
+        <p:spPr/>
+        <p:txBody>
+          <a:bodyPr/>
+          <a:lstStyle/>
+          <a:p>
+            <a:r>
+              <a:rPr lang="en-US" dirty="0"/>
+              <a:t>Composite Pattern - Structural </a:t>
+            </a:r>
+            <a:endParaRPr lang="en-US" dirty="0"/>
+          </a:p>
+        </p:txBody>
+      </p:sp>
+      <p:sp>
+        <p:nvSpPr>
+          <p:cNvPr id="3" name="Content Placeholder 2"/>
+          <p:cNvSpPr>
+            <a:spLocks noGrp="1"/>
+          </p:cNvSpPr>
+          <p:nvPr>
+            <p:ph idx="1"/>
+          </p:nvPr>
+        </p:nvSpPr>
+        <p:spPr/>
+        <p:txBody>
+          <a:bodyPr>
+            <a:normAutofit/>
+          </a:bodyPr>
+          <a:lstStyle/>
+          <a:p>
+            <a:r>
+              <a:rPr lang="en-GB" sz="1600" dirty="0" smtClean="0"/>
+              <a:t>Hierarchical tree structure</a:t>
+            </a:r>
+          </a:p>
+          <a:p>
+            <a:r>
+              <a:rPr lang="en-GB" sz="1600" dirty="0" smtClean="0"/>
+              <a:t>Example: Windows file system, Products and Product </a:t>
+            </a:r>
+            <a:r>
+              <a:rPr lang="en-GB" sz="1600" dirty="0" err="1" smtClean="0"/>
+              <a:t>Catalog</a:t>
+            </a:r>
+            <a:endParaRPr lang="en-GB" sz="1600" dirty="0" smtClean="0"/>
+          </a:p>
+          <a:p>
+            <a:r>
+              <a:rPr lang="en-GB" sz="1600" dirty="0"/>
+              <a:t>A node can have one or more leaves or other nodes. This is called </a:t>
+            </a:r>
+            <a:r>
+              <a:rPr lang="en-GB" sz="1600" i="1" dirty="0"/>
+              <a:t>recursive composition</a:t>
+            </a:r>
+            <a:r>
+              <a:rPr lang="en-GB" sz="1600" dirty="0"/>
+              <a:t> and can be best illustrated through a file system directory structure.</a:t>
+            </a:r>
+            <a:endParaRPr lang="en-GB" sz="1600" dirty="0" smtClean="0"/>
+          </a:p>
+          <a:p>
+            <a:endParaRPr lang="en-GB" sz="1400" dirty="0"/>
+          </a:p>
+        </p:txBody>
+      </p:sp>
+    </p:spTree>
+    <p:extLst>
+      <p:ext uri="{BB962C8B-B14F-4D97-AF65-F5344CB8AC3E}">
+        <p14:creationId xmlns:p14="http://schemas.microsoft.com/office/powerpoint/2010/main" val="3228692001"/>
       </p:ext>
     </p:extLst>
   </p:cSld>

</xml_diff>